<commit_message>
Updated added in colab badge for Transfer Learning Notebook
</commit_message>
<xml_diff>
--- a/Lesson 3/03 - State of the Art in Artificial Intelligence.pptx
+++ b/Lesson 3/03 - State of the Art in Artificial Intelligence.pptx
@@ -5,7 +5,7 @@
     <p:sldMasterId id="2147483660" r:id="rId1"/>
   </p:sldMasterIdLst>
   <p:notesMasterIdLst>
-    <p:notesMasterId r:id="rId18"/>
+    <p:notesMasterId r:id="rId19"/>
   </p:notesMasterIdLst>
   <p:sldIdLst>
     <p:sldId id="256" r:id="rId2"/>
@@ -22,25 +22,26 @@
     <p:sldId id="274" r:id="rId13"/>
     <p:sldId id="275" r:id="rId14"/>
     <p:sldId id="276" r:id="rId15"/>
-    <p:sldId id="265" r:id="rId16"/>
-    <p:sldId id="264" r:id="rId17"/>
+    <p:sldId id="277" r:id="rId16"/>
+    <p:sldId id="265" r:id="rId17"/>
+    <p:sldId id="264" r:id="rId18"/>
   </p:sldIdLst>
   <p:sldSz cx="9144000" cy="5143500" type="screen16x9"/>
   <p:notesSz cx="6858000" cy="9144000"/>
   <p:embeddedFontLst>
     <p:embeddedFont>
       <p:font typeface="Montserrat" panose="020B0604020202020204" charset="0"/>
-      <p:regular r:id="rId19"/>
-      <p:bold r:id="rId20"/>
-      <p:italic r:id="rId21"/>
-      <p:boldItalic r:id="rId22"/>
+      <p:regular r:id="rId20"/>
+      <p:bold r:id="rId21"/>
+      <p:italic r:id="rId22"/>
+      <p:boldItalic r:id="rId23"/>
     </p:embeddedFont>
     <p:embeddedFont>
       <p:font typeface="Raleway" panose="020B0604020202020204" charset="0"/>
-      <p:regular r:id="rId23"/>
-      <p:bold r:id="rId24"/>
-      <p:italic r:id="rId25"/>
-      <p:boldItalic r:id="rId26"/>
+      <p:regular r:id="rId24"/>
+      <p:bold r:id="rId25"/>
+      <p:italic r:id="rId26"/>
+      <p:boldItalic r:id="rId27"/>
     </p:embeddedFont>
   </p:embeddedFontLst>
   <p:defaultTextStyle>
@@ -1628,6 +1629,133 @@
     </p:spTree>
     <p:extLst>
       <p:ext uri="{BB962C8B-B14F-4D97-AF65-F5344CB8AC3E}">
+        <p14:creationId xmlns:p14="http://schemas.microsoft.com/office/powerpoint/2010/main" val="2288693744"/>
+      </p:ext>
+    </p:extLst>
+  </p:cSld>
+  <p:clrMapOvr>
+    <a:masterClrMapping/>
+  </p:clrMapOvr>
+</p:notes>
+</file>
+
+<file path=ppt/notesSlides/notesSlide16.xml><?xml version="1.0" encoding="utf-8"?>
+<p:notes xmlns:a="http://schemas.openxmlformats.org/drawingml/2006/main" xmlns:r="http://schemas.openxmlformats.org/officeDocument/2006/relationships" xmlns:p="http://schemas.openxmlformats.org/presentationml/2006/main" showMasterSp="0" showMasterPhAnim="0">
+  <p:cSld>
+    <p:spTree>
+      <p:nvGrpSpPr>
+        <p:cNvPr id="1" name="Shape 93"/>
+        <p:cNvGrpSpPr/>
+        <p:nvPr/>
+      </p:nvGrpSpPr>
+      <p:grpSpPr>
+        <a:xfrm>
+          <a:off x="0" y="0"/>
+          <a:ext cx="0" cy="0"/>
+          <a:chOff x="0" y="0"/>
+          <a:chExt cx="0" cy="0"/>
+        </a:xfrm>
+      </p:grpSpPr>
+      <p:sp>
+        <p:nvSpPr>
+          <p:cNvPr id="94" name="Google Shape;94;gadb7ee4d84_2_68:notes"/>
+          <p:cNvSpPr>
+            <a:spLocks noGrp="1" noRot="1" noChangeAspect="1"/>
+          </p:cNvSpPr>
+          <p:nvPr>
+            <p:ph type="sldImg" idx="2"/>
+          </p:nvPr>
+        </p:nvSpPr>
+        <p:spPr>
+          <a:xfrm>
+            <a:off x="381000" y="685800"/>
+            <a:ext cx="6096000" cy="3429000"/>
+          </a:xfrm>
+          <a:custGeom>
+            <a:avLst/>
+            <a:gdLst/>
+            <a:ahLst/>
+            <a:cxnLst/>
+            <a:rect l="l" t="t" r="r" b="b"/>
+            <a:pathLst>
+              <a:path w="120000" h="120000" extrusionOk="0">
+                <a:moveTo>
+                  <a:pt x="0" y="0"/>
+                </a:moveTo>
+                <a:lnTo>
+                  <a:pt x="120000" y="0"/>
+                </a:lnTo>
+                <a:lnTo>
+                  <a:pt x="120000" y="120000"/>
+                </a:lnTo>
+                <a:lnTo>
+                  <a:pt x="0" y="120000"/>
+                </a:lnTo>
+                <a:close/>
+              </a:path>
+            </a:pathLst>
+          </a:custGeom>
+          <a:noFill/>
+          <a:ln w="9525" cap="flat" cmpd="sng">
+            <a:solidFill>
+              <a:srgbClr val="000000"/>
+            </a:solidFill>
+            <a:prstDash val="solid"/>
+            <a:round/>
+            <a:headEnd type="none" w="sm" len="sm"/>
+            <a:tailEnd type="none" w="sm" len="sm"/>
+          </a:ln>
+        </p:spPr>
+      </p:sp>
+      <p:sp>
+        <p:nvSpPr>
+          <p:cNvPr id="95" name="Google Shape;95;gadb7ee4d84_2_68:notes"/>
+          <p:cNvSpPr txBox="1">
+            <a:spLocks noGrp="1"/>
+          </p:cNvSpPr>
+          <p:nvPr>
+            <p:ph type="body" idx="1"/>
+          </p:nvPr>
+        </p:nvSpPr>
+        <p:spPr>
+          <a:xfrm>
+            <a:off x="685800" y="4343400"/>
+            <a:ext cx="5486400" cy="4114800"/>
+          </a:xfrm>
+          <a:prstGeom prst="rect">
+            <a:avLst/>
+          </a:prstGeom>
+          <a:noFill/>
+          <a:ln>
+            <a:noFill/>
+          </a:ln>
+        </p:spPr>
+        <p:txBody>
+          <a:bodyPr spcFirstLastPara="1" wrap="square" lIns="91425" tIns="91425" rIns="91425" bIns="91425" anchor="t" anchorCtr="0">
+            <a:noAutofit/>
+          </a:bodyPr>
+          <a:lstStyle/>
+          <a:p>
+            <a:pPr marL="0" lvl="0" indent="0" algn="l" rtl="0">
+              <a:lnSpc>
+                <a:spcPct val="100000"/>
+              </a:lnSpc>
+              <a:spcBef>
+                <a:spcPts val="0"/>
+              </a:spcBef>
+              <a:spcAft>
+                <a:spcPts val="0"/>
+              </a:spcAft>
+              <a:buSzPts val="1100"/>
+              <a:buNone/>
+            </a:pPr>
+            <a:endParaRPr/>
+          </a:p>
+        </p:txBody>
+      </p:sp>
+    </p:spTree>
+    <p:extLst>
+      <p:ext uri="{BB962C8B-B14F-4D97-AF65-F5344CB8AC3E}">
         <p14:creationId xmlns:p14="http://schemas.microsoft.com/office/powerpoint/2010/main" val="2130368620"/>
       </p:ext>
     </p:extLst>
@@ -1638,7 +1766,7 @@
 </p:notes>
 </file>
 
-<file path=ppt/notesSlides/notesSlide16.xml><?xml version="1.0" encoding="utf-8"?>
+<file path=ppt/notesSlides/notesSlide17.xml><?xml version="1.0" encoding="utf-8"?>
 <p:notes xmlns:a="http://schemas.openxmlformats.org/drawingml/2006/main" xmlns:r="http://schemas.openxmlformats.org/officeDocument/2006/relationships" xmlns:p="http://schemas.openxmlformats.org/presentationml/2006/main" showMasterSp="0" showMasterPhAnim="0">
   <p:cSld>
     <p:spTree>
@@ -11214,7 +11342,7 @@
                   <a:srgbClr val="FFFFFF"/>
                 </a:solidFill>
               </a:rPr>
-              <a:t>Steps in transfer learning include:</a:t>
+              <a:t>Procedure to implement transfer learning:</a:t>
             </a:r>
           </a:p>
           <a:p>
@@ -11306,6 +11434,552 @@
                 </a:solidFill>
               </a:rPr>
               <a:t>	=&gt; Higher asymptote.</a:t>
+            </a:r>
+          </a:p>
+        </p:txBody>
+      </p:sp>
+    </p:spTree>
+    <p:extLst>
+      <p:ext uri="{BB962C8B-B14F-4D97-AF65-F5344CB8AC3E}">
+        <p14:creationId xmlns:p14="http://schemas.microsoft.com/office/powerpoint/2010/main" val="3684178746"/>
+      </p:ext>
+    </p:extLst>
+  </p:cSld>
+  <p:clrMapOvr>
+    <a:masterClrMapping/>
+  </p:clrMapOvr>
+</p:sld>
+</file>
+
+<file path=ppt/slides/slide16.xml><?xml version="1.0" encoding="utf-8"?>
+<p:sld xmlns:a="http://schemas.openxmlformats.org/drawingml/2006/main" xmlns:r="http://schemas.openxmlformats.org/officeDocument/2006/relationships" xmlns:p="http://schemas.openxmlformats.org/presentationml/2006/main">
+  <p:cSld>
+    <p:spTree>
+      <p:nvGrpSpPr>
+        <p:cNvPr id="1" name="Shape 96"/>
+        <p:cNvGrpSpPr/>
+        <p:nvPr/>
+      </p:nvGrpSpPr>
+      <p:grpSpPr>
+        <a:xfrm>
+          <a:off x="0" y="0"/>
+          <a:ext cx="0" cy="0"/>
+          <a:chOff x="0" y="0"/>
+          <a:chExt cx="0" cy="0"/>
+        </a:xfrm>
+      </p:grpSpPr>
+      <p:sp>
+        <p:nvSpPr>
+          <p:cNvPr id="97" name="Google Shape;97;p18"/>
+          <p:cNvSpPr txBox="1">
+            <a:spLocks noGrp="1"/>
+          </p:cNvSpPr>
+          <p:nvPr>
+            <p:ph type="ctrTitle"/>
+          </p:nvPr>
+        </p:nvSpPr>
+        <p:spPr>
+          <a:xfrm>
+            <a:off x="311700" y="246200"/>
+            <a:ext cx="8520600" cy="477900"/>
+          </a:xfrm>
+          <a:prstGeom prst="rect">
+            <a:avLst/>
+          </a:prstGeom>
+          <a:solidFill>
+            <a:srgbClr val="B4914C"/>
+          </a:solidFill>
+          <a:ln>
+            <a:noFill/>
+          </a:ln>
+        </p:spPr>
+        <p:txBody>
+          <a:bodyPr spcFirstLastPara="1" wrap="square" lIns="91425" tIns="91425" rIns="91425" bIns="91425" anchor="ctr" anchorCtr="0">
+            <a:noAutofit/>
+          </a:bodyPr>
+          <a:lstStyle/>
+          <a:p>
+            <a:pPr marL="0" lvl="0" indent="0" algn="l" rtl="0">
+              <a:lnSpc>
+                <a:spcPct val="100000"/>
+              </a:lnSpc>
+              <a:spcBef>
+                <a:spcPts val="0"/>
+              </a:spcBef>
+              <a:spcAft>
+                <a:spcPts val="0"/>
+              </a:spcAft>
+              <a:buSzPts val="5200"/>
+              <a:buNone/>
+            </a:pPr>
+            <a:r>
+              <a:rPr lang="en" sz="2400" dirty="0">
+                <a:latin typeface="Montserrat"/>
+                <a:ea typeface="Montserrat"/>
+                <a:cs typeface="Montserrat"/>
+                <a:sym typeface="Montserrat"/>
+              </a:rPr>
+              <a:t>Transfer Learning</a:t>
+            </a:r>
+            <a:endParaRPr sz="2400" dirty="0">
+              <a:solidFill>
+                <a:srgbClr val="FFFFFF"/>
+              </a:solidFill>
+              <a:latin typeface="Montserrat"/>
+              <a:ea typeface="Montserrat"/>
+              <a:cs typeface="Montserrat"/>
+              <a:sym typeface="Montserrat"/>
+            </a:endParaRPr>
+          </a:p>
+        </p:txBody>
+      </p:sp>
+      <p:sp>
+        <p:nvSpPr>
+          <p:cNvPr id="98" name="Google Shape;98;p18"/>
+          <p:cNvSpPr txBox="1">
+            <a:spLocks noGrp="1"/>
+          </p:cNvSpPr>
+          <p:nvPr>
+            <p:ph type="sldNum" idx="12"/>
+          </p:nvPr>
+        </p:nvSpPr>
+        <p:spPr>
+          <a:xfrm>
+            <a:off x="8472458" y="4663217"/>
+            <a:ext cx="548700" cy="393600"/>
+          </a:xfrm>
+          <a:prstGeom prst="rect">
+            <a:avLst/>
+          </a:prstGeom>
+          <a:noFill/>
+          <a:ln>
+            <a:noFill/>
+          </a:ln>
+        </p:spPr>
+        <p:txBody>
+          <a:bodyPr spcFirstLastPara="1" wrap="square" lIns="91425" tIns="91425" rIns="91425" bIns="91425" anchor="ctr" anchorCtr="0">
+            <a:noAutofit/>
+          </a:bodyPr>
+          <a:lstStyle/>
+          <a:p>
+            <a:pPr marL="0" lvl="0" indent="0" algn="r" rtl="0">
+              <a:spcBef>
+                <a:spcPts val="0"/>
+              </a:spcBef>
+              <a:spcAft>
+                <a:spcPts val="0"/>
+              </a:spcAft>
+              <a:buNone/>
+            </a:pPr>
+            <a:fld id="{00000000-1234-1234-1234-123412341234}" type="slidenum">
+              <a:rPr lang="en"/>
+              <a:t>16</a:t>
+            </a:fld>
+            <a:endParaRPr/>
+          </a:p>
+        </p:txBody>
+      </p:sp>
+      <p:pic>
+        <p:nvPicPr>
+          <p:cNvPr id="100" name="Google Shape;100;p18"/>
+          <p:cNvPicPr preferRelativeResize="0"/>
+          <p:nvPr/>
+        </p:nvPicPr>
+        <p:blipFill>
+          <a:blip r:embed="rId3">
+            <a:alphaModFix/>
+          </a:blip>
+          <a:stretch>
+            <a:fillRect/>
+          </a:stretch>
+        </p:blipFill>
+        <p:spPr>
+          <a:xfrm>
+            <a:off x="7845625" y="3845113"/>
+            <a:ext cx="1298375" cy="1298375"/>
+          </a:xfrm>
+          <a:prstGeom prst="rect">
+            <a:avLst/>
+          </a:prstGeom>
+          <a:noFill/>
+          <a:ln>
+            <a:noFill/>
+          </a:ln>
+        </p:spPr>
+      </p:pic>
+      <p:sp>
+        <p:nvSpPr>
+          <p:cNvPr id="2" name="TextBox 1">
+            <a:extLst>
+              <a:ext uri="{FF2B5EF4-FFF2-40B4-BE49-F238E27FC236}">
+                <a16:creationId xmlns:a16="http://schemas.microsoft.com/office/drawing/2014/main" id="{2F7CA16E-98BA-489A-922F-FD63A20E106C}"/>
+              </a:ext>
+            </a:extLst>
+          </p:cNvPr>
+          <p:cNvSpPr txBox="1"/>
+          <p:nvPr/>
+        </p:nvSpPr>
+        <p:spPr>
+          <a:xfrm>
+            <a:off x="838579" y="1691107"/>
+            <a:ext cx="7007046" cy="1169551"/>
+          </a:xfrm>
+          <a:prstGeom prst="rect">
+            <a:avLst/>
+          </a:prstGeom>
+          <a:noFill/>
+        </p:spPr>
+        <p:txBody>
+          <a:bodyPr wrap="none" rtlCol="0">
+            <a:spAutoFit/>
+          </a:bodyPr>
+          <a:lstStyle/>
+          <a:p>
+            <a:pPr marL="285750" indent="-285750">
+              <a:buFont typeface="Arial" panose="020B0604020202020204" pitchFamily="34" charset="0"/>
+              <a:buChar char="•"/>
+            </a:pPr>
+            <a:r>
+              <a:rPr lang="en-US" dirty="0">
+                <a:solidFill>
+                  <a:srgbClr val="FFFFFF"/>
+                </a:solidFill>
+              </a:rPr>
+              <a:t>Steps involved in Transfer Learning Include:</a:t>
+            </a:r>
+          </a:p>
+          <a:p>
+            <a:r>
+              <a:rPr lang="en-US" dirty="0">
+                <a:solidFill>
+                  <a:srgbClr val="FFFFFF"/>
+                </a:solidFill>
+              </a:rPr>
+              <a:t>	=&gt; Download and Load a pre-trained model.</a:t>
+            </a:r>
+          </a:p>
+          <a:p>
+            <a:r>
+              <a:rPr lang="en-US" dirty="0">
+                <a:solidFill>
+                  <a:srgbClr val="FFFFFF"/>
+                </a:solidFill>
+              </a:rPr>
+              <a:t>	=&gt; Freeze the parameters of the hidden Layers.</a:t>
+            </a:r>
+          </a:p>
+          <a:p>
+            <a:r>
+              <a:rPr lang="en-US" dirty="0">
+                <a:solidFill>
+                  <a:srgbClr val="FFFFFF"/>
+                </a:solidFill>
+              </a:rPr>
+              <a:t>	=&gt; Modify the output layer to match the classes you are looking to classify.</a:t>
+            </a:r>
+          </a:p>
+          <a:p>
+            <a:r>
+              <a:rPr lang="en-US" dirty="0">
+                <a:solidFill>
+                  <a:srgbClr val="FFFFFF"/>
+                </a:solidFill>
+              </a:rPr>
+              <a:t>	=&gt; Train the network with the modified model.</a:t>
+            </a:r>
+          </a:p>
+        </p:txBody>
+      </p:sp>
+      <p:sp>
+        <p:nvSpPr>
+          <p:cNvPr id="6" name="Google Shape;97;p18">
+            <a:extLst>
+              <a:ext uri="{FF2B5EF4-FFF2-40B4-BE49-F238E27FC236}">
+                <a16:creationId xmlns:a16="http://schemas.microsoft.com/office/drawing/2014/main" id="{5159018F-4602-4D7C-9F36-956D1DE457D6}"/>
+              </a:ext>
+            </a:extLst>
+          </p:cNvPr>
+          <p:cNvSpPr txBox="1">
+            <a:spLocks/>
+          </p:cNvSpPr>
+          <p:nvPr/>
+        </p:nvSpPr>
+        <p:spPr>
+          <a:xfrm>
+            <a:off x="311700" y="820487"/>
+            <a:ext cx="8520600" cy="477900"/>
+          </a:xfrm>
+          <a:prstGeom prst="rect">
+            <a:avLst/>
+          </a:prstGeom>
+          <a:solidFill>
+            <a:srgbClr val="B4914C"/>
+          </a:solidFill>
+          <a:ln>
+            <a:noFill/>
+          </a:ln>
+        </p:spPr>
+        <p:txBody>
+          <a:bodyPr spcFirstLastPara="1" wrap="square" lIns="91425" tIns="91425" rIns="91425" bIns="91425" anchor="ctr" anchorCtr="0">
+            <a:noAutofit/>
+          </a:bodyPr>
+          <a:lstStyle>
+            <a:defPPr marR="0" lvl="0" algn="l" rtl="0">
+              <a:lnSpc>
+                <a:spcPct val="100000"/>
+              </a:lnSpc>
+              <a:spcBef>
+                <a:spcPts val="0"/>
+              </a:spcBef>
+              <a:spcAft>
+                <a:spcPts val="0"/>
+              </a:spcAft>
+            </a:defPPr>
+            <a:lvl1pPr marR="0" lvl="0" algn="ctr" rtl="0">
+              <a:lnSpc>
+                <a:spcPct val="100000"/>
+              </a:lnSpc>
+              <a:spcBef>
+                <a:spcPts val="0"/>
+              </a:spcBef>
+              <a:spcAft>
+                <a:spcPts val="0"/>
+              </a:spcAft>
+              <a:buClr>
+                <a:srgbClr val="FFFFFF"/>
+              </a:buClr>
+              <a:buSzPts val="5200"/>
+              <a:buFont typeface="Arial"/>
+              <a:buNone/>
+              <a:defRPr sz="5200" b="0" i="0" u="none" strike="noStrike" cap="none">
+                <a:solidFill>
+                  <a:srgbClr val="FFFFFF"/>
+                </a:solidFill>
+                <a:latin typeface="Arial"/>
+                <a:ea typeface="Arial"/>
+                <a:cs typeface="Arial"/>
+                <a:sym typeface="Arial"/>
+              </a:defRPr>
+            </a:lvl1pPr>
+            <a:lvl2pPr marR="0" lvl="1" algn="ctr" rtl="0">
+              <a:lnSpc>
+                <a:spcPct val="100000"/>
+              </a:lnSpc>
+              <a:spcBef>
+                <a:spcPts val="0"/>
+              </a:spcBef>
+              <a:spcAft>
+                <a:spcPts val="0"/>
+              </a:spcAft>
+              <a:buClr>
+                <a:schemeClr val="dk1"/>
+              </a:buClr>
+              <a:buSzPts val="5200"/>
+              <a:buFont typeface="Arial"/>
+              <a:buNone/>
+              <a:defRPr sz="5200" b="0" i="0" u="none" strike="noStrike" cap="none">
+                <a:solidFill>
+                  <a:schemeClr val="dk1"/>
+                </a:solidFill>
+                <a:latin typeface="Arial"/>
+                <a:ea typeface="Arial"/>
+                <a:cs typeface="Arial"/>
+                <a:sym typeface="Arial"/>
+              </a:defRPr>
+            </a:lvl2pPr>
+            <a:lvl3pPr marR="0" lvl="2" algn="ctr" rtl="0">
+              <a:lnSpc>
+                <a:spcPct val="100000"/>
+              </a:lnSpc>
+              <a:spcBef>
+                <a:spcPts val="0"/>
+              </a:spcBef>
+              <a:spcAft>
+                <a:spcPts val="0"/>
+              </a:spcAft>
+              <a:buClr>
+                <a:schemeClr val="dk1"/>
+              </a:buClr>
+              <a:buSzPts val="5200"/>
+              <a:buFont typeface="Arial"/>
+              <a:buNone/>
+              <a:defRPr sz="5200" b="0" i="0" u="none" strike="noStrike" cap="none">
+                <a:solidFill>
+                  <a:schemeClr val="dk1"/>
+                </a:solidFill>
+                <a:latin typeface="Arial"/>
+                <a:ea typeface="Arial"/>
+                <a:cs typeface="Arial"/>
+                <a:sym typeface="Arial"/>
+              </a:defRPr>
+            </a:lvl3pPr>
+            <a:lvl4pPr marR="0" lvl="3" algn="ctr" rtl="0">
+              <a:lnSpc>
+                <a:spcPct val="100000"/>
+              </a:lnSpc>
+              <a:spcBef>
+                <a:spcPts val="0"/>
+              </a:spcBef>
+              <a:spcAft>
+                <a:spcPts val="0"/>
+              </a:spcAft>
+              <a:buClr>
+                <a:schemeClr val="dk1"/>
+              </a:buClr>
+              <a:buSzPts val="5200"/>
+              <a:buFont typeface="Arial"/>
+              <a:buNone/>
+              <a:defRPr sz="5200" b="0" i="0" u="none" strike="noStrike" cap="none">
+                <a:solidFill>
+                  <a:schemeClr val="dk1"/>
+                </a:solidFill>
+                <a:latin typeface="Arial"/>
+                <a:ea typeface="Arial"/>
+                <a:cs typeface="Arial"/>
+                <a:sym typeface="Arial"/>
+              </a:defRPr>
+            </a:lvl4pPr>
+            <a:lvl5pPr marR="0" lvl="4" algn="ctr" rtl="0">
+              <a:lnSpc>
+                <a:spcPct val="100000"/>
+              </a:lnSpc>
+              <a:spcBef>
+                <a:spcPts val="0"/>
+              </a:spcBef>
+              <a:spcAft>
+                <a:spcPts val="0"/>
+              </a:spcAft>
+              <a:buClr>
+                <a:schemeClr val="dk1"/>
+              </a:buClr>
+              <a:buSzPts val="5200"/>
+              <a:buFont typeface="Arial"/>
+              <a:buNone/>
+              <a:defRPr sz="5200" b="0" i="0" u="none" strike="noStrike" cap="none">
+                <a:solidFill>
+                  <a:schemeClr val="dk1"/>
+                </a:solidFill>
+                <a:latin typeface="Arial"/>
+                <a:ea typeface="Arial"/>
+                <a:cs typeface="Arial"/>
+                <a:sym typeface="Arial"/>
+              </a:defRPr>
+            </a:lvl5pPr>
+            <a:lvl6pPr marR="0" lvl="5" algn="ctr" rtl="0">
+              <a:lnSpc>
+                <a:spcPct val="100000"/>
+              </a:lnSpc>
+              <a:spcBef>
+                <a:spcPts val="0"/>
+              </a:spcBef>
+              <a:spcAft>
+                <a:spcPts val="0"/>
+              </a:spcAft>
+              <a:buClr>
+                <a:schemeClr val="dk1"/>
+              </a:buClr>
+              <a:buSzPts val="5200"/>
+              <a:buFont typeface="Arial"/>
+              <a:buNone/>
+              <a:defRPr sz="5200" b="0" i="0" u="none" strike="noStrike" cap="none">
+                <a:solidFill>
+                  <a:schemeClr val="dk1"/>
+                </a:solidFill>
+                <a:latin typeface="Arial"/>
+                <a:ea typeface="Arial"/>
+                <a:cs typeface="Arial"/>
+                <a:sym typeface="Arial"/>
+              </a:defRPr>
+            </a:lvl6pPr>
+            <a:lvl7pPr marR="0" lvl="6" algn="ctr" rtl="0">
+              <a:lnSpc>
+                <a:spcPct val="100000"/>
+              </a:lnSpc>
+              <a:spcBef>
+                <a:spcPts val="0"/>
+              </a:spcBef>
+              <a:spcAft>
+                <a:spcPts val="0"/>
+              </a:spcAft>
+              <a:buClr>
+                <a:schemeClr val="dk1"/>
+              </a:buClr>
+              <a:buSzPts val="5200"/>
+              <a:buFont typeface="Arial"/>
+              <a:buNone/>
+              <a:defRPr sz="5200" b="0" i="0" u="none" strike="noStrike" cap="none">
+                <a:solidFill>
+                  <a:schemeClr val="dk1"/>
+                </a:solidFill>
+                <a:latin typeface="Arial"/>
+                <a:ea typeface="Arial"/>
+                <a:cs typeface="Arial"/>
+                <a:sym typeface="Arial"/>
+              </a:defRPr>
+            </a:lvl7pPr>
+            <a:lvl8pPr marR="0" lvl="7" algn="ctr" rtl="0">
+              <a:lnSpc>
+                <a:spcPct val="100000"/>
+              </a:lnSpc>
+              <a:spcBef>
+                <a:spcPts val="0"/>
+              </a:spcBef>
+              <a:spcAft>
+                <a:spcPts val="0"/>
+              </a:spcAft>
+              <a:buClr>
+                <a:schemeClr val="dk1"/>
+              </a:buClr>
+              <a:buSzPts val="5200"/>
+              <a:buFont typeface="Arial"/>
+              <a:buNone/>
+              <a:defRPr sz="5200" b="0" i="0" u="none" strike="noStrike" cap="none">
+                <a:solidFill>
+                  <a:schemeClr val="dk1"/>
+                </a:solidFill>
+                <a:latin typeface="Arial"/>
+                <a:ea typeface="Arial"/>
+                <a:cs typeface="Arial"/>
+                <a:sym typeface="Arial"/>
+              </a:defRPr>
+            </a:lvl8pPr>
+            <a:lvl9pPr marR="0" lvl="8" algn="ctr" rtl="0">
+              <a:lnSpc>
+                <a:spcPct val="100000"/>
+              </a:lnSpc>
+              <a:spcBef>
+                <a:spcPts val="0"/>
+              </a:spcBef>
+              <a:spcAft>
+                <a:spcPts val="0"/>
+              </a:spcAft>
+              <a:buClr>
+                <a:schemeClr val="dk1"/>
+              </a:buClr>
+              <a:buSzPts val="5200"/>
+              <a:buFont typeface="Arial"/>
+              <a:buNone/>
+              <a:defRPr sz="5200" b="0" i="0" u="none" strike="noStrike" cap="none">
+                <a:solidFill>
+                  <a:schemeClr val="dk1"/>
+                </a:solidFill>
+                <a:latin typeface="Arial"/>
+                <a:ea typeface="Arial"/>
+                <a:cs typeface="Arial"/>
+                <a:sym typeface="Arial"/>
+              </a:defRPr>
+            </a:lvl9pPr>
+          </a:lstStyle>
+          <a:p>
+            <a:pPr algn="l"/>
+            <a:r>
+              <a:rPr lang="en-US" sz="2400" dirty="0">
+                <a:latin typeface="Montserrat"/>
+                <a:ea typeface="Montserrat"/>
+                <a:cs typeface="Montserrat"/>
+                <a:sym typeface="Montserrat"/>
+              </a:rPr>
+              <a:t>Steps involved in Transfer Learning</a:t>
             </a:r>
           </a:p>
         </p:txBody>
@@ -11323,7 +11997,7 @@
 </p:sld>
 </file>
 
-<file path=ppt/slides/slide16.xml><?xml version="1.0" encoding="utf-8"?>
+<file path=ppt/slides/slide17.xml><?xml version="1.0" encoding="utf-8"?>
 <p:sld xmlns:a="http://schemas.openxmlformats.org/drawingml/2006/main" xmlns:r="http://schemas.openxmlformats.org/officeDocument/2006/relationships" xmlns:p="http://schemas.openxmlformats.org/presentationml/2006/main">
   <p:cSld>
     <p:spTree>
@@ -11412,7 +12086,7 @@
                   <a:schemeClr val="dk2"/>
                 </a:solidFill>
               </a:rPr>
-              <a:t>16</a:t>
+              <a:t>17</a:t>
             </a:fld>
             <a:endParaRPr>
               <a:solidFill>

</xml_diff>